<commit_message>
Adapt slide to minimum size
</commit_message>
<xml_diff>
--- a/doc/Presentación.pptx
+++ b/doc/Presentación.pptx
@@ -36,26 +36,26 @@
   <p:notesSz cx="6858000" cy="9144000"/>
   <p:embeddedFontLst>
     <p:embeddedFont>
-      <p:font typeface="Montserrat" panose="020B0604020202020204" charset="0"/>
+      <p:font typeface="Helvetica" panose="020B0604020202020204" pitchFamily="34" charset="0"/>
       <p:regular r:id="rId26"/>
       <p:bold r:id="rId27"/>
+      <p:italic r:id="rId28"/>
+      <p:boldItalic r:id="rId29"/>
     </p:embeddedFont>
     <p:embeddedFont>
       <p:font typeface="Calibri" panose="020F0502020204030204" pitchFamily="34" charset="0"/>
-      <p:regular r:id="rId28"/>
-      <p:bold r:id="rId29"/>
-      <p:italic r:id="rId30"/>
-      <p:boldItalic r:id="rId31"/>
+      <p:regular r:id="rId30"/>
+      <p:bold r:id="rId31"/>
+      <p:italic r:id="rId32"/>
+      <p:boldItalic r:id="rId33"/>
     </p:embeddedFont>
     <p:embeddedFont>
-      <p:font typeface="Source Sans Pro" panose="020B0604020202020204" charset="0"/>
-      <p:regular r:id="rId32"/>
-      <p:bold r:id="rId33"/>
-      <p:italic r:id="rId34"/>
-      <p:boldItalic r:id="rId35"/>
+      <p:font typeface="Montserrat" panose="00000500000000000000" pitchFamily="50" charset="0"/>
+      <p:regular r:id="rId34"/>
+      <p:bold r:id="rId35"/>
     </p:embeddedFont>
     <p:embeddedFont>
-      <p:font typeface="Helvetica" panose="020B0604020202020204" pitchFamily="34" charset="0"/>
+      <p:font typeface="Source Sans Pro" panose="020B0503030403020204" pitchFamily="34" charset="0"/>
       <p:regular r:id="rId36"/>
       <p:bold r:id="rId37"/>
       <p:italic r:id="rId38"/>
@@ -8651,14 +8651,7 @@
                 <a:latin typeface="SF Display" panose="00000500000000000000" pitchFamily="50" charset="0"/>
                 <a:ea typeface="SF Display" panose="00000500000000000000" pitchFamily="50" charset="0"/>
               </a:rPr>
-              <a:t>Texto </a:t>
-            </a:r>
-            <a:r>
-              <a:rPr lang="es-ES" sz="700" dirty="0" smtClean="0">
-                <a:latin typeface="SF Display" panose="00000500000000000000" pitchFamily="50" charset="0"/>
-                <a:ea typeface="SF Display" panose="00000500000000000000" pitchFamily="50" charset="0"/>
-              </a:rPr>
-              <a:t>por defecto en la barra de búsqueda.</a:t>
+              <a:t>Texto por defecto en la barra de búsqueda.</a:t>
             </a:r>
             <a:endParaRPr lang="es-ES" sz="700" dirty="0">
               <a:latin typeface="SF Display" panose="00000500000000000000" pitchFamily="50" charset="0"/>
@@ -12395,28 +12388,14 @@
                 <a:latin typeface="SF Display" panose="00000500000000000000" pitchFamily="50" charset="0"/>
                 <a:ea typeface="SF Display" panose="00000500000000000000" pitchFamily="50" charset="0"/>
               </a:rPr>
-              <a:t>búsqueda </a:t>
-            </a:r>
-            <a:r>
-              <a:rPr lang="es-ES" sz="900" b="1" dirty="0" smtClean="0">
-                <a:latin typeface="SF Display" panose="00000500000000000000" pitchFamily="50" charset="0"/>
-                <a:ea typeface="SF Display" panose="00000500000000000000" pitchFamily="50" charset="0"/>
-              </a:rPr>
-              <a:t>funcione </a:t>
+              <a:t>búsqueda funcione </a:t>
             </a:r>
             <a:r>
               <a:rPr lang="es-ES" sz="900" dirty="0" smtClean="0">
                 <a:latin typeface="SF Display" panose="00000500000000000000" pitchFamily="50" charset="0"/>
                 <a:ea typeface="SF Display" panose="00000500000000000000" pitchFamily="50" charset="0"/>
               </a:rPr>
-              <a:t>aún </a:t>
-            </a:r>
-            <a:r>
-              <a:rPr lang="es-ES" sz="900" dirty="0" smtClean="0">
-                <a:latin typeface="SF Display" panose="00000500000000000000" pitchFamily="50" charset="0"/>
-                <a:ea typeface="SF Display" panose="00000500000000000000" pitchFamily="50" charset="0"/>
-              </a:rPr>
-              <a:t>nos queda modificar aquellos métodos encargados de montar la tabla de comidas, los cuales ya vienen dados en la implementación base: </a:t>
+              <a:t>aún nos queda modificar aquellos métodos encargados de montar la tabla de comidas, los cuales ya vienen dados en la implementación base: </a:t>
             </a:r>
             <a:endParaRPr lang="es-ES" sz="900" dirty="0">
               <a:latin typeface="SF Display" panose="00000500000000000000" pitchFamily="50" charset="0"/>
@@ -15192,14 +15171,6 @@
               </a:rPr>
               <a:t>    </a:t>
             </a:r>
-            <a:endParaRPr lang="es-ES" sz="800" dirty="0" smtClean="0">
-              <a:solidFill>
-                <a:srgbClr val="000000"/>
-              </a:solidFill>
-              <a:latin typeface="SF Display" panose="00000500000000000000" pitchFamily="50" charset="0"/>
-              <a:ea typeface="SF Display" panose="00000500000000000000" pitchFamily="50" charset="0"/>
-              <a:cs typeface="Menlo-Regular"/>
-            </a:endParaRPr>
           </a:p>
           <a:p>
             <a:pPr marL="76200" indent="0">
@@ -15681,35 +15652,7 @@
                 <a:latin typeface="SF Display" panose="00000500000000000000" pitchFamily="50" charset="0"/>
                 <a:ea typeface="SF Display" panose="00000500000000000000" pitchFamily="50" charset="0"/>
               </a:rPr>
-              <a:t> habrá que pasarle la comida correcta si se selecciona una fila para modificarla, y a la hora de volver a nuestra vista, habrá que </a:t>
-            </a:r>
-            <a:r>
-              <a:rPr lang="es-ES" sz="900" dirty="0" smtClean="0">
-                <a:latin typeface="SF Display" panose="00000500000000000000" pitchFamily="50" charset="0"/>
-                <a:ea typeface="SF Display" panose="00000500000000000000" pitchFamily="50" charset="0"/>
-              </a:rPr>
-              <a:t>tener en cuenta que </a:t>
-            </a:r>
-            <a:r>
-              <a:rPr lang="es-ES" sz="900" dirty="0" smtClean="0">
-                <a:latin typeface="SF Display" panose="00000500000000000000" pitchFamily="50" charset="0"/>
-                <a:ea typeface="SF Display" panose="00000500000000000000" pitchFamily="50" charset="0"/>
-              </a:rPr>
-              <a:t>la comida </a:t>
-            </a:r>
-            <a:r>
-              <a:rPr lang="es-ES" sz="900" dirty="0" smtClean="0">
-                <a:latin typeface="SF Display" panose="00000500000000000000" pitchFamily="50" charset="0"/>
-                <a:ea typeface="SF Display" panose="00000500000000000000" pitchFamily="50" charset="0"/>
-              </a:rPr>
-              <a:t>actualizada </a:t>
-            </a:r>
-            <a:r>
-              <a:rPr lang="es-ES" sz="900" dirty="0" smtClean="0">
-                <a:latin typeface="SF Display" panose="00000500000000000000" pitchFamily="50" charset="0"/>
-                <a:ea typeface="SF Display" panose="00000500000000000000" pitchFamily="50" charset="0"/>
-              </a:rPr>
-              <a:t>puede no encajar en la búsqueda en curso (si hay una).</a:t>
+              <a:t> habrá que pasarle la comida correcta si se selecciona una fila para modificarla, y a la hora de volver a nuestra vista, habrá que tener en cuenta que la comida actualizada puede no encajar en la búsqueda en curso (si hay una).</a:t>
             </a:r>
           </a:p>
           <a:p>
@@ -15724,28 +15667,7 @@
                 <a:latin typeface="SF Display" panose="00000500000000000000" pitchFamily="50" charset="0"/>
                 <a:ea typeface="SF Display" panose="00000500000000000000" pitchFamily="50" charset="0"/>
               </a:rPr>
-              <a:t>Nosotros </a:t>
-            </a:r>
-            <a:r>
-              <a:rPr lang="es-ES" sz="900" dirty="0" smtClean="0">
-                <a:latin typeface="SF Display" panose="00000500000000000000" pitchFamily="50" charset="0"/>
-                <a:ea typeface="SF Display" panose="00000500000000000000" pitchFamily="50" charset="0"/>
-              </a:rPr>
-              <a:t>consideraremos </a:t>
-            </a:r>
-            <a:r>
-              <a:rPr lang="es-ES" sz="900" dirty="0" smtClean="0">
-                <a:latin typeface="SF Display" panose="00000500000000000000" pitchFamily="50" charset="0"/>
-                <a:ea typeface="SF Display" panose="00000500000000000000" pitchFamily="50" charset="0"/>
-              </a:rPr>
-              <a:t>que sólo se puede realizar la acción de actualizar y eliminar mientras haya una </a:t>
-            </a:r>
-            <a:r>
-              <a:rPr lang="es-ES" sz="900" dirty="0" smtClean="0">
-                <a:latin typeface="SF Display" panose="00000500000000000000" pitchFamily="50" charset="0"/>
-                <a:ea typeface="SF Display" panose="00000500000000000000" pitchFamily="50" charset="0"/>
-              </a:rPr>
-              <a:t>búsqueda en curso.</a:t>
+              <a:t>Nosotros consideraremos que sólo se puede realizar la acción de actualizar y eliminar mientras haya una búsqueda en curso.</a:t>
             </a:r>
             <a:endParaRPr lang="es-ES" sz="800" dirty="0" smtClean="0">
               <a:latin typeface="SF Display" panose="00000500000000000000" pitchFamily="50" charset="0"/>
@@ -17649,8 +17571,8 @@
         </p:nvSpPr>
         <p:spPr>
           <a:xfrm>
-            <a:off x="4624233" y="1804872"/>
-            <a:ext cx="3481108" cy="1918511"/>
+            <a:off x="4748694" y="2011245"/>
+            <a:ext cx="3389401" cy="652081"/>
           </a:xfrm>
           <a:prstGeom prst="rect">
             <a:avLst/>
@@ -17680,7 +17602,7 @@
         </p:nvSpPr>
         <p:spPr>
           <a:xfrm>
-            <a:off x="1088165" y="1804873"/>
+            <a:off x="1072006" y="2010195"/>
             <a:ext cx="3490413" cy="1918511"/>
           </a:xfrm>
           <a:prstGeom prst="rect">
@@ -17763,7 +17685,7 @@
         </p:nvSpPr>
         <p:spPr>
           <a:xfrm>
-            <a:off x="437679" y="1784175"/>
+            <a:off x="437677" y="2003511"/>
             <a:ext cx="4759073" cy="2234275"/>
           </a:xfrm>
           <a:prstGeom prst="rect">
@@ -19076,7 +18998,7 @@
         </p:nvSpPr>
         <p:spPr>
           <a:xfrm>
-            <a:off x="1010200" y="1320125"/>
+            <a:off x="1009931" y="1382895"/>
             <a:ext cx="7003434" cy="230832"/>
           </a:xfrm>
           <a:prstGeom prst="rect">
@@ -19126,8 +19048,8 @@
         </p:nvSpPr>
         <p:spPr>
           <a:xfrm>
-            <a:off x="1009931" y="3782846"/>
-            <a:ext cx="3568647" cy="507831"/>
+            <a:off x="994136" y="3953004"/>
+            <a:ext cx="7147364" cy="369332"/>
           </a:xfrm>
           <a:prstGeom prst="rect">
             <a:avLst/>
@@ -19145,35 +19067,7 @@
                 <a:latin typeface="SF Display" panose="00000500000000000000" pitchFamily="50" charset="0"/>
                 <a:ea typeface="SF Display" panose="00000500000000000000" pitchFamily="50" charset="0"/>
               </a:rPr>
-              <a:t>Es posible que la comida </a:t>
-            </a:r>
-            <a:r>
-              <a:rPr lang="es-ES" sz="900" dirty="0" smtClean="0">
-                <a:latin typeface="SF Display" panose="00000500000000000000" pitchFamily="50" charset="0"/>
-                <a:ea typeface="SF Display" panose="00000500000000000000" pitchFamily="50" charset="0"/>
-              </a:rPr>
-              <a:t>actualizada </a:t>
-            </a:r>
-            <a:r>
-              <a:rPr lang="es-ES" sz="900" dirty="0" smtClean="0">
-                <a:latin typeface="SF Display" panose="00000500000000000000" pitchFamily="50" charset="0"/>
-                <a:ea typeface="SF Display" panose="00000500000000000000" pitchFamily="50" charset="0"/>
-              </a:rPr>
-              <a:t>no encaje </a:t>
-            </a:r>
-            <a:r>
-              <a:rPr lang="es-ES" sz="900" dirty="0" smtClean="0">
-                <a:latin typeface="SF Display" panose="00000500000000000000" pitchFamily="50" charset="0"/>
-                <a:ea typeface="SF Display" panose="00000500000000000000" pitchFamily="50" charset="0"/>
-              </a:rPr>
-              <a:t>en la búsqueda </a:t>
-            </a:r>
-            <a:r>
-              <a:rPr lang="es-ES" sz="900" dirty="0" smtClean="0">
-                <a:latin typeface="SF Display" panose="00000500000000000000" pitchFamily="50" charset="0"/>
-                <a:ea typeface="SF Display" panose="00000500000000000000" pitchFamily="50" charset="0"/>
-              </a:rPr>
-              <a:t>activa, y esto es lo que se comprueba en </a:t>
+              <a:t>Es posible que la comida actualizada no encaje en la búsqueda activa, y esto es lo que se comprueba en </a:t>
             </a:r>
             <a:r>
               <a:rPr lang="es-ES" sz="900" b="1" dirty="0" err="1" smtClean="0">
@@ -19204,7 +19098,7 @@
         </p:nvSpPr>
         <p:spPr>
           <a:xfrm>
-            <a:off x="2310678" y="1550957"/>
+            <a:off x="2310676" y="1630556"/>
             <a:ext cx="1013077" cy="253916"/>
           </a:xfrm>
           <a:prstGeom prst="rect">
@@ -19242,7 +19136,7 @@
         </p:nvSpPr>
         <p:spPr>
           <a:xfrm>
-            <a:off x="3999360" y="1786561"/>
+            <a:off x="4129084" y="2010195"/>
             <a:ext cx="4493376" cy="1713484"/>
           </a:xfrm>
           <a:prstGeom prst="rect">
@@ -19527,18 +19421,7 @@
                 <a:ea typeface="SF Display" panose="00000500000000000000" pitchFamily="50" charset="0"/>
                 <a:cs typeface="Menlo-Regular"/>
               </a:rPr>
-              <a:t>	                   </a:t>
-            </a:r>
-            <a:r>
-              <a:rPr lang="en-US" sz="600" b="1" dirty="0" smtClean="0">
-                <a:solidFill>
-                  <a:srgbClr val="AA0D91"/>
-                </a:solidFill>
-                <a:latin typeface="SF Display" panose="00000500000000000000" pitchFamily="50" charset="0"/>
-                <a:ea typeface="SF Display" panose="00000500000000000000" pitchFamily="50" charset="0"/>
-                <a:cs typeface="Menlo-Regular"/>
-              </a:rPr>
-              <a:t>let</a:t>
+              <a:t>	                   let</a:t>
             </a:r>
             <a:r>
               <a:rPr lang="en-US" sz="600" b="1" dirty="0" smtClean="0">
@@ -19839,18 +19722,7 @@
                 <a:ea typeface="SF Display" panose="00000500000000000000" pitchFamily="50" charset="0"/>
                 <a:cs typeface="Menlo-Regular"/>
               </a:rPr>
-              <a:t> </a:t>
-            </a:r>
-            <a:r>
-              <a:rPr lang="es-ES" sz="600" b="1" dirty="0" smtClean="0">
-                <a:solidFill>
-                  <a:srgbClr val="000000"/>
-                </a:solidFill>
-                <a:latin typeface="SF Display" panose="00000500000000000000" pitchFamily="50" charset="0"/>
-                <a:ea typeface="SF Display" panose="00000500000000000000" pitchFamily="50" charset="0"/>
-                <a:cs typeface="Menlo-Regular"/>
-              </a:rPr>
-              <a:t>	                   </a:t>
+              <a:t> 	                   </a:t>
             </a:r>
             <a:endParaRPr lang="es-ES" sz="600" dirty="0" smtClean="0">
               <a:latin typeface="SF Display" panose="00000500000000000000" pitchFamily="50" charset="0"/>
@@ -19906,7 +19778,7 @@
         </p:nvSpPr>
         <p:spPr>
           <a:xfrm>
-            <a:off x="6045296" y="1549763"/>
+            <a:off x="6084299" y="1607962"/>
             <a:ext cx="789680" cy="253916"/>
           </a:xfrm>
           <a:prstGeom prst="rect">
@@ -19942,8 +19814,8 @@
         </p:nvSpPr>
         <p:spPr>
           <a:xfrm>
-            <a:off x="4580463" y="3782845"/>
-            <a:ext cx="3568647" cy="646331"/>
+            <a:off x="4682223" y="2729944"/>
+            <a:ext cx="3455871" cy="646331"/>
           </a:xfrm>
           <a:prstGeom prst="rect">
             <a:avLst/>
@@ -19977,10 +19849,6 @@
               </a:rPr>
               <a:t>.</a:t>
             </a:r>
-            <a:endParaRPr lang="es-ES" sz="900" dirty="0" smtClean="0">
-              <a:latin typeface="SF Display" panose="00000500000000000000" pitchFamily="50" charset="0"/>
-              <a:ea typeface="SF Display" panose="00000500000000000000" pitchFamily="50" charset="0"/>
-            </a:endParaRPr>
           </a:p>
           <a:p>
             <a:r>
@@ -19995,28 +19863,7 @@
                 <a:latin typeface="SF Display" panose="00000500000000000000" pitchFamily="50" charset="0"/>
                 <a:ea typeface="SF Display" panose="00000500000000000000" pitchFamily="50" charset="0"/>
               </a:rPr>
-              <a:t> </a:t>
-            </a:r>
-            <a:r>
-              <a:rPr lang="es-ES" sz="900" dirty="0" smtClean="0">
-                <a:latin typeface="SF Display" panose="00000500000000000000" pitchFamily="50" charset="0"/>
-                <a:ea typeface="SF Display" panose="00000500000000000000" pitchFamily="50" charset="0"/>
-              </a:rPr>
-              <a:t>especifica la fila donde </a:t>
-            </a:r>
-            <a:r>
-              <a:rPr lang="es-ES" sz="900" dirty="0" smtClean="0">
-                <a:latin typeface="SF Display" panose="00000500000000000000" pitchFamily="50" charset="0"/>
-                <a:ea typeface="SF Display" panose="00000500000000000000" pitchFamily="50" charset="0"/>
-              </a:rPr>
-              <a:t>aparecerá </a:t>
-            </a:r>
-            <a:r>
-              <a:rPr lang="es-ES" sz="900" dirty="0" smtClean="0">
-                <a:latin typeface="SF Display" panose="00000500000000000000" pitchFamily="50" charset="0"/>
-                <a:ea typeface="SF Display" panose="00000500000000000000" pitchFamily="50" charset="0"/>
-              </a:rPr>
-              <a:t>la nueva comida en la tabla.</a:t>
+              <a:t> especifica la fila donde aparecerá la nueva comida en la tabla.</a:t>
             </a:r>
             <a:endParaRPr lang="es-ES" sz="900" dirty="0">
               <a:latin typeface="SF Display" panose="00000500000000000000" pitchFamily="50" charset="0"/>
@@ -25765,10 +25612,6 @@
               </a:rPr>
               <a:t>.</a:t>
             </a:r>
-            <a:endParaRPr lang="es-ES" sz="800" dirty="0">
-              <a:latin typeface="SF Display" panose="00000500000000000000" pitchFamily="50" charset="0"/>
-              <a:ea typeface="SF Display" panose="00000500000000000000" pitchFamily="50" charset="0"/>
-            </a:endParaRPr>
           </a:p>
         </p:txBody>
       </p:sp>
@@ -25956,18 +25799,7 @@
                 <a:ea typeface="Times New Roman" panose="02020603050405020304" pitchFamily="18" charset="0"/>
                 <a:cs typeface="Calibri" panose="020F0502020204030204" pitchFamily="34" charset="0"/>
               </a:rPr>
-              <a:t> </a:t>
-            </a:r>
-            <a:r>
-              <a:rPr lang="en-US" sz="800" dirty="0" smtClean="0">
-                <a:solidFill>
-                  <a:srgbClr val="000000"/>
-                </a:solidFill>
-                <a:latin typeface="SF Display" panose="00000500000000000000" pitchFamily="50" charset="0"/>
-                <a:ea typeface="Times New Roman" panose="02020603050405020304" pitchFamily="18" charset="0"/>
-                <a:cs typeface="Calibri" panose="020F0502020204030204" pitchFamily="34" charset="0"/>
-              </a:rPr>
-              <a:t>{</a:t>
+              <a:t> {</a:t>
             </a:r>
           </a:p>
           <a:p>
@@ -30677,19 +30509,8 @@
                 <a:latin typeface="SF Display" panose="00000500000000000000" pitchFamily="50" charset="0"/>
                 <a:ea typeface="SF Display" panose="00000500000000000000" pitchFamily="50" charset="0"/>
               </a:rPr>
-              <a:t>Lista dinámica de elementos en forma de tabla. </a:t>
-            </a:r>
-            <a:r>
-              <a:rPr lang="en" sz="1100" dirty="0" smtClean="0">
-                <a:latin typeface="SF Display" panose="00000500000000000000" pitchFamily="50" charset="0"/>
-                <a:ea typeface="SF Display" panose="00000500000000000000" pitchFamily="50" charset="0"/>
-              </a:rPr>
-              <a:t>Necesitamos especificar los siguientes atributos:</a:t>
-            </a:r>
-            <a:endParaRPr lang="en" sz="1100" dirty="0" smtClean="0">
-              <a:latin typeface="SF Display" panose="00000500000000000000" pitchFamily="50" charset="0"/>
-              <a:ea typeface="SF Display" panose="00000500000000000000" pitchFamily="50" charset="0"/>
-            </a:endParaRPr>
+              <a:t>Lista dinámica de elementos en forma de tabla. Necesitamos especificar los siguientes atributos:</a:t>
+            </a:r>
           </a:p>
           <a:p>
             <a:pPr marL="171450" indent="-171450"/>

</xml_diff>